<commit_message>
Release v1.18 docs (#1530)
Signed-off-by: nannanli <nannanli@cn.ibm.com>
</commit_message>
<xml_diff>
--- a/docs/images/common/zowe-directories.pptx
+++ b/docs/images/common/zowe-directories.pptx
@@ -198,7 +198,7 @@
           <a:p>
             <a:fld id="{26E70E1E-3B7C-8D4D-B700-360134022E14}" type="datetimeFigureOut">
               <a:rPr lang="en-CN" smtClean="0"/>
-              <a:t>2020/9/29</a:t>
+              <a:t>11/27/20</a:t>
             </a:fld>
             <a:endParaRPr lang="en-CN"/>
           </a:p>
@@ -613,7 +613,7 @@
           <a:p>
             <a:fld id="{B1DB1BE8-3F77-D044-8747-9903AC5CD864}" type="datetimeFigureOut">
               <a:rPr lang="en-US" smtClean="0"/>
-              <a:t>9/29/20</a:t>
+              <a:t>11/27/20</a:t>
             </a:fld>
             <a:endParaRPr lang="en-US"/>
           </a:p>
@@ -811,7 +811,7 @@
           <a:p>
             <a:fld id="{B1DB1BE8-3F77-D044-8747-9903AC5CD864}" type="datetimeFigureOut">
               <a:rPr lang="en-US" smtClean="0"/>
-              <a:t>9/29/20</a:t>
+              <a:t>11/27/20</a:t>
             </a:fld>
             <a:endParaRPr lang="en-US"/>
           </a:p>
@@ -1019,7 +1019,7 @@
           <a:p>
             <a:fld id="{B1DB1BE8-3F77-D044-8747-9903AC5CD864}" type="datetimeFigureOut">
               <a:rPr lang="en-US" smtClean="0"/>
-              <a:t>9/29/20</a:t>
+              <a:t>11/27/20</a:t>
             </a:fld>
             <a:endParaRPr lang="en-US"/>
           </a:p>
@@ -1217,7 +1217,7 @@
           <a:p>
             <a:fld id="{B1DB1BE8-3F77-D044-8747-9903AC5CD864}" type="datetimeFigureOut">
               <a:rPr lang="en-US" smtClean="0"/>
-              <a:t>9/29/20</a:t>
+              <a:t>11/27/20</a:t>
             </a:fld>
             <a:endParaRPr lang="en-US"/>
           </a:p>
@@ -1492,7 +1492,7 @@
           <a:p>
             <a:fld id="{B1DB1BE8-3F77-D044-8747-9903AC5CD864}" type="datetimeFigureOut">
               <a:rPr lang="en-US" smtClean="0"/>
-              <a:t>9/29/20</a:t>
+              <a:t>11/27/20</a:t>
             </a:fld>
             <a:endParaRPr lang="en-US"/>
           </a:p>
@@ -1757,7 +1757,7 @@
           <a:p>
             <a:fld id="{B1DB1BE8-3F77-D044-8747-9903AC5CD864}" type="datetimeFigureOut">
               <a:rPr lang="en-US" smtClean="0"/>
-              <a:t>9/29/20</a:t>
+              <a:t>11/27/20</a:t>
             </a:fld>
             <a:endParaRPr lang="en-US"/>
           </a:p>
@@ -2169,7 +2169,7 @@
           <a:p>
             <a:fld id="{B1DB1BE8-3F77-D044-8747-9903AC5CD864}" type="datetimeFigureOut">
               <a:rPr lang="en-US" smtClean="0"/>
-              <a:t>9/29/20</a:t>
+              <a:t>11/27/20</a:t>
             </a:fld>
             <a:endParaRPr lang="en-US"/>
           </a:p>
@@ -2310,7 +2310,7 @@
           <a:p>
             <a:fld id="{B1DB1BE8-3F77-D044-8747-9903AC5CD864}" type="datetimeFigureOut">
               <a:rPr lang="en-US" smtClean="0"/>
-              <a:t>9/29/20</a:t>
+              <a:t>11/27/20</a:t>
             </a:fld>
             <a:endParaRPr lang="en-US"/>
           </a:p>
@@ -2423,7 +2423,7 @@
           <a:p>
             <a:fld id="{B1DB1BE8-3F77-D044-8747-9903AC5CD864}" type="datetimeFigureOut">
               <a:rPr lang="en-US" smtClean="0"/>
-              <a:t>9/29/20</a:t>
+              <a:t>11/27/20</a:t>
             </a:fld>
             <a:endParaRPr lang="en-US"/>
           </a:p>
@@ -2734,7 +2734,7 @@
           <a:p>
             <a:fld id="{B1DB1BE8-3F77-D044-8747-9903AC5CD864}" type="datetimeFigureOut">
               <a:rPr lang="en-US" smtClean="0"/>
-              <a:t>9/29/20</a:t>
+              <a:t>11/27/20</a:t>
             </a:fld>
             <a:endParaRPr lang="en-US"/>
           </a:p>
@@ -3022,7 +3022,7 @@
           <a:p>
             <a:fld id="{B1DB1BE8-3F77-D044-8747-9903AC5CD864}" type="datetimeFigureOut">
               <a:rPr lang="en-US" smtClean="0"/>
-              <a:t>9/29/20</a:t>
+              <a:t>11/27/20</a:t>
             </a:fld>
             <a:endParaRPr lang="en-US"/>
           </a:p>
@@ -3263,7 +3263,7 @@
           <a:p>
             <a:fld id="{B1DB1BE8-3F77-D044-8747-9903AC5CD864}" type="datetimeFigureOut">
               <a:rPr lang="en-US" smtClean="0"/>
-              <a:t>9/29/20</a:t>
+              <a:t>11/27/20</a:t>
             </a:fld>
             <a:endParaRPr lang="en-US"/>
           </a:p>
@@ -6142,220 +6142,6 @@
           </a:p>
         </p:txBody>
       </p:sp>
-      <p:sp>
-        <p:nvSpPr>
-          <p:cNvPr id="74" name="Rectangle 73">
-            <a:extLst>
-              <a:ext uri="{FF2B5EF4-FFF2-40B4-BE49-F238E27FC236}">
-                <a16:creationId xmlns:a16="http://schemas.microsoft.com/office/drawing/2014/main" id="{5B01EE44-7A7A-DB48-80B0-EFB58C8E6D47}"/>
-              </a:ext>
-            </a:extLst>
-          </p:cNvPr>
-          <p:cNvSpPr/>
-          <p:nvPr/>
-        </p:nvSpPr>
-        <p:spPr>
-          <a:xfrm>
-            <a:off x="240577" y="5277858"/>
-            <a:ext cx="4285577" cy="1479813"/>
-          </a:xfrm>
-          <a:prstGeom prst="rect">
-            <a:avLst/>
-          </a:prstGeom>
-          <a:solidFill>
-            <a:schemeClr val="tx1"/>
-          </a:solidFill>
-        </p:spPr>
-        <p:style>
-          <a:lnRef idx="2">
-            <a:schemeClr val="accent1">
-              <a:shade val="50000"/>
-            </a:schemeClr>
-          </a:lnRef>
-          <a:fillRef idx="1">
-            <a:schemeClr val="accent1"/>
-          </a:fillRef>
-          <a:effectRef idx="0">
-            <a:schemeClr val="accent1"/>
-          </a:effectRef>
-          <a:fontRef idx="minor">
-            <a:schemeClr val="lt1"/>
-          </a:fontRef>
-        </p:style>
-        <p:txBody>
-          <a:bodyPr rtlCol="0" anchor="ctr"/>
-          <a:lstStyle/>
-          <a:p>
-            <a:r>
-              <a:rPr lang="en-US" sz="1000" b="1" dirty="0">
-                <a:solidFill>
-                  <a:srgbClr val="FF0000"/>
-                </a:solidFill>
-                <a:latin typeface="Menlo" panose="020B0609030804020204" pitchFamily="49" charset="0"/>
-                <a:ea typeface="Menlo" panose="020B0609030804020204" pitchFamily="49" charset="0"/>
-                <a:cs typeface="Menlo" panose="020B0609030804020204" pitchFamily="49" charset="0"/>
-              </a:rPr>
-              <a:t>Digital ring information for user ZWESVUSR:</a:t>
-            </a:r>
-          </a:p>
-          <a:p>
-            <a:r>
-              <a:rPr lang="en-US" sz="1000" b="1" dirty="0">
-                <a:solidFill>
-                  <a:srgbClr val="FF0000"/>
-                </a:solidFill>
-                <a:latin typeface="Menlo" panose="020B0609030804020204" pitchFamily="49" charset="0"/>
-                <a:ea typeface="Menlo" panose="020B0609030804020204" pitchFamily="49" charset="0"/>
-                <a:cs typeface="Menlo" panose="020B0609030804020204" pitchFamily="49" charset="0"/>
-              </a:rPr>
-              <a:t>Ring: &gt;</a:t>
-            </a:r>
-            <a:r>
-              <a:rPr lang="en-US" sz="1000" b="1" dirty="0" err="1">
-                <a:solidFill>
-                  <a:srgbClr val="FF0000"/>
-                </a:solidFill>
-                <a:latin typeface="Menlo" panose="020B0609030804020204" pitchFamily="49" charset="0"/>
-                <a:ea typeface="Menlo" panose="020B0609030804020204" pitchFamily="49" charset="0"/>
-                <a:cs typeface="Menlo" panose="020B0609030804020204" pitchFamily="49" charset="0"/>
-              </a:rPr>
-              <a:t>ZoweKeyring</a:t>
-            </a:r>
-            <a:r>
-              <a:rPr lang="en-US" sz="1000" b="1" dirty="0">
-                <a:solidFill>
-                  <a:srgbClr val="FF0000"/>
-                </a:solidFill>
-                <a:latin typeface="Menlo" panose="020B0609030804020204" pitchFamily="49" charset="0"/>
-                <a:ea typeface="Menlo" panose="020B0609030804020204" pitchFamily="49" charset="0"/>
-                <a:cs typeface="Menlo" panose="020B0609030804020204" pitchFamily="49" charset="0"/>
-              </a:rPr>
-              <a:t>&lt;</a:t>
-            </a:r>
-          </a:p>
-          <a:p>
-            <a:r>
-              <a:rPr lang="en-US" sz="1000" b="1" dirty="0">
-                <a:solidFill>
-                  <a:srgbClr val="FF0000"/>
-                </a:solidFill>
-                <a:latin typeface="Menlo" panose="020B0609030804020204" pitchFamily="49" charset="0"/>
-                <a:ea typeface="Menlo" panose="020B0609030804020204" pitchFamily="49" charset="0"/>
-                <a:cs typeface="Menlo" panose="020B0609030804020204" pitchFamily="49" charset="0"/>
-              </a:rPr>
-              <a:t>Cert Label Name  Cert Owner      USAGE       PERSONAL</a:t>
-            </a:r>
-          </a:p>
-          <a:p>
-            <a:r>
-              <a:rPr lang="en-US" sz="1000" b="1" dirty="0">
-                <a:solidFill>
-                  <a:srgbClr val="FF0000"/>
-                </a:solidFill>
-                <a:latin typeface="Menlo" panose="020B0609030804020204" pitchFamily="49" charset="0"/>
-                <a:ea typeface="Menlo" panose="020B0609030804020204" pitchFamily="49" charset="0"/>
-                <a:cs typeface="Menlo" panose="020B0609030804020204" pitchFamily="49" charset="0"/>
-              </a:rPr>
-              <a:t>---------------  -------------   ---------   -----</a:t>
-            </a:r>
-          </a:p>
-          <a:p>
-            <a:r>
-              <a:rPr lang="en-US" sz="1000" b="1" dirty="0" err="1">
-                <a:solidFill>
-                  <a:srgbClr val="FF0000"/>
-                </a:solidFill>
-                <a:latin typeface="Menlo" panose="020B0609030804020204" pitchFamily="49" charset="0"/>
-                <a:ea typeface="Menlo" panose="020B0609030804020204" pitchFamily="49" charset="0"/>
-                <a:cs typeface="Menlo" panose="020B0609030804020204" pitchFamily="49" charset="0"/>
-              </a:rPr>
-              <a:t>ZoweCert</a:t>
-            </a:r>
-            <a:r>
-              <a:rPr lang="en-US" sz="1000" b="1" dirty="0">
-                <a:solidFill>
-                  <a:srgbClr val="FF0000"/>
-                </a:solidFill>
-                <a:latin typeface="Menlo" panose="020B0609030804020204" pitchFamily="49" charset="0"/>
-                <a:ea typeface="Menlo" panose="020B0609030804020204" pitchFamily="49" charset="0"/>
-                <a:cs typeface="Menlo" panose="020B0609030804020204" pitchFamily="49" charset="0"/>
-              </a:rPr>
-              <a:t>	     ID(ZWESVUSR)    PERSONAL    NO</a:t>
-            </a:r>
-          </a:p>
-          <a:p>
-            <a:r>
-              <a:rPr lang="en-US" sz="1000" b="1" dirty="0" err="1">
-                <a:solidFill>
-                  <a:srgbClr val="FF0000"/>
-                </a:solidFill>
-                <a:latin typeface="Menlo" panose="020B0609030804020204" pitchFamily="49" charset="0"/>
-                <a:ea typeface="Menlo" panose="020B0609030804020204" pitchFamily="49" charset="0"/>
-                <a:cs typeface="Menlo" panose="020B0609030804020204" pitchFamily="49" charset="0"/>
-              </a:rPr>
-              <a:t>Localca</a:t>
-            </a:r>
-            <a:r>
-              <a:rPr lang="en-US" sz="1000" b="1" dirty="0">
-                <a:solidFill>
-                  <a:srgbClr val="FF0000"/>
-                </a:solidFill>
-                <a:latin typeface="Menlo" panose="020B0609030804020204" pitchFamily="49" charset="0"/>
-                <a:ea typeface="Menlo" panose="020B0609030804020204" pitchFamily="49" charset="0"/>
-                <a:cs typeface="Menlo" panose="020B0609030804020204" pitchFamily="49" charset="0"/>
-              </a:rPr>
-              <a:t>          CERTAUTH        CERTRAUTH   NO</a:t>
-            </a:r>
-          </a:p>
-          <a:p>
-            <a:r>
-              <a:rPr lang="en-US" sz="1000" b="1" dirty="0">
-                <a:solidFill>
-                  <a:srgbClr val="FF0000"/>
-                </a:solidFill>
-                <a:latin typeface="Menlo" panose="020B0609030804020204" pitchFamily="49" charset="0"/>
-                <a:ea typeface="Menlo" panose="020B0609030804020204" pitchFamily="49" charset="0"/>
-                <a:cs typeface="Menlo" panose="020B0609030804020204" pitchFamily="49" charset="0"/>
-              </a:rPr>
-              <a:t>Localhost        ID(ZWESVUSR)    PERSONAL    NO</a:t>
-            </a:r>
-          </a:p>
-          <a:p>
-            <a:r>
-              <a:rPr lang="en-US" sz="1000" b="1" dirty="0" err="1">
-                <a:solidFill>
-                  <a:srgbClr val="FF0000"/>
-                </a:solidFill>
-                <a:latin typeface="Menlo" panose="020B0609030804020204" pitchFamily="49" charset="0"/>
-                <a:ea typeface="Menlo" panose="020B0609030804020204" pitchFamily="49" charset="0"/>
-                <a:cs typeface="Menlo" panose="020B0609030804020204" pitchFamily="49" charset="0"/>
-              </a:rPr>
-              <a:t>Jwtsecret</a:t>
-            </a:r>
-            <a:r>
-              <a:rPr lang="en-US" sz="1000" b="1" dirty="0">
-                <a:solidFill>
-                  <a:srgbClr val="FF0000"/>
-                </a:solidFill>
-                <a:latin typeface="Menlo" panose="020B0609030804020204" pitchFamily="49" charset="0"/>
-                <a:ea typeface="Menlo" panose="020B0609030804020204" pitchFamily="49" charset="0"/>
-                <a:cs typeface="Menlo" panose="020B0609030804020204" pitchFamily="49" charset="0"/>
-              </a:rPr>
-              <a:t>        ID(ZWESVUSR)    PERSONAL    NO</a:t>
-            </a:r>
-          </a:p>
-          <a:p>
-            <a:endParaRPr lang="en-US" sz="1000" b="1" dirty="0">
-              <a:solidFill>
-                <a:srgbClr val="FF0000"/>
-              </a:solidFill>
-              <a:latin typeface="Arial" panose="020B0604020202020204" pitchFamily="34" charset="0"/>
-              <a:ea typeface="Menlo" panose="020B0609030804020204" pitchFamily="49" charset="0"/>
-              <a:cs typeface="Arial" panose="020B0604020202020204" pitchFamily="34" charset="0"/>
-            </a:endParaRPr>
-          </a:p>
-        </p:txBody>
-      </p:sp>
       <p:cxnSp>
         <p:nvCxnSpPr>
           <p:cNvPr id="75" name="Straight Arrow Connector 74">
@@ -7769,6 +7555,196 @@
               </a:rPr>
               <a:t>creates</a:t>
             </a:r>
+          </a:p>
+        </p:txBody>
+      </p:sp>
+      <p:sp>
+        <p:nvSpPr>
+          <p:cNvPr id="57" name="Rectangle 56">
+            <a:extLst>
+              <a:ext uri="{FF2B5EF4-FFF2-40B4-BE49-F238E27FC236}">
+                <a16:creationId xmlns:a16="http://schemas.microsoft.com/office/drawing/2014/main" id="{C3005050-9D0D-E34D-BAA6-A26E4F10C0AA}"/>
+              </a:ext>
+            </a:extLst>
+          </p:cNvPr>
+          <p:cNvSpPr/>
+          <p:nvPr/>
+        </p:nvSpPr>
+        <p:spPr>
+          <a:xfrm>
+            <a:off x="240577" y="5277858"/>
+            <a:ext cx="4285577" cy="1489869"/>
+          </a:xfrm>
+          <a:prstGeom prst="rect">
+            <a:avLst/>
+          </a:prstGeom>
+          <a:solidFill>
+            <a:schemeClr val="tx1"/>
+          </a:solidFill>
+        </p:spPr>
+        <p:style>
+          <a:lnRef idx="2">
+            <a:schemeClr val="accent1">
+              <a:shade val="50000"/>
+            </a:schemeClr>
+          </a:lnRef>
+          <a:fillRef idx="1">
+            <a:schemeClr val="accent1"/>
+          </a:fillRef>
+          <a:effectRef idx="0">
+            <a:schemeClr val="accent1"/>
+          </a:effectRef>
+          <a:fontRef idx="minor">
+            <a:schemeClr val="lt1"/>
+          </a:fontRef>
+        </p:style>
+        <p:txBody>
+          <a:bodyPr rtlCol="0" anchor="ctr"/>
+          <a:lstStyle/>
+          <a:p>
+            <a:r>
+              <a:rPr lang="en-US" sz="1000" b="1" dirty="0">
+                <a:solidFill>
+                  <a:srgbClr val="FF0000"/>
+                </a:solidFill>
+                <a:latin typeface="Menlo" panose="020B0609030804020204" pitchFamily="49" charset="0"/>
+                <a:ea typeface="Menlo" panose="020B0609030804020204" pitchFamily="49" charset="0"/>
+                <a:cs typeface="Menlo" panose="020B0609030804020204" pitchFamily="49" charset="0"/>
+              </a:rPr>
+              <a:t>Digital ring information for user ZWESVUSR:</a:t>
+            </a:r>
+          </a:p>
+          <a:p>
+            <a:r>
+              <a:rPr lang="en-US" sz="1000" b="1" dirty="0">
+                <a:solidFill>
+                  <a:srgbClr val="FF0000"/>
+                </a:solidFill>
+                <a:latin typeface="Menlo" panose="020B0609030804020204" pitchFamily="49" charset="0"/>
+                <a:ea typeface="Menlo" panose="020B0609030804020204" pitchFamily="49" charset="0"/>
+                <a:cs typeface="Menlo" panose="020B0609030804020204" pitchFamily="49" charset="0"/>
+              </a:rPr>
+              <a:t>Ring: &gt;</a:t>
+            </a:r>
+            <a:r>
+              <a:rPr lang="en-US" sz="1000" b="1" dirty="0" err="1">
+                <a:solidFill>
+                  <a:srgbClr val="FF0000"/>
+                </a:solidFill>
+                <a:latin typeface="Menlo" panose="020B0609030804020204" pitchFamily="49" charset="0"/>
+                <a:ea typeface="Menlo" panose="020B0609030804020204" pitchFamily="49" charset="0"/>
+                <a:cs typeface="Menlo" panose="020B0609030804020204" pitchFamily="49" charset="0"/>
+              </a:rPr>
+              <a:t>ZoweKeyring</a:t>
+            </a:r>
+            <a:r>
+              <a:rPr lang="en-US" sz="1000" b="1" dirty="0">
+                <a:solidFill>
+                  <a:srgbClr val="FF0000"/>
+                </a:solidFill>
+                <a:latin typeface="Menlo" panose="020B0609030804020204" pitchFamily="49" charset="0"/>
+                <a:ea typeface="Menlo" panose="020B0609030804020204" pitchFamily="49" charset="0"/>
+                <a:cs typeface="Menlo" panose="020B0609030804020204" pitchFamily="49" charset="0"/>
+              </a:rPr>
+              <a:t>&lt;</a:t>
+            </a:r>
+          </a:p>
+          <a:p>
+            <a:r>
+              <a:rPr lang="en-US" sz="1000" b="1" dirty="0">
+                <a:solidFill>
+                  <a:srgbClr val="FF0000"/>
+                </a:solidFill>
+                <a:latin typeface="Menlo" panose="020B0609030804020204" pitchFamily="49" charset="0"/>
+                <a:ea typeface="Menlo" panose="020B0609030804020204" pitchFamily="49" charset="0"/>
+                <a:cs typeface="Menlo" panose="020B0609030804020204" pitchFamily="49" charset="0"/>
+              </a:rPr>
+              <a:t>Cert Label Name  Cert Owner      USAGE       PERSONAL</a:t>
+            </a:r>
+          </a:p>
+          <a:p>
+            <a:r>
+              <a:rPr lang="en-US" sz="1000" b="1" dirty="0">
+                <a:solidFill>
+                  <a:srgbClr val="FF0000"/>
+                </a:solidFill>
+                <a:latin typeface="Menlo" panose="020B0609030804020204" pitchFamily="49" charset="0"/>
+                <a:ea typeface="Menlo" panose="020B0609030804020204" pitchFamily="49" charset="0"/>
+                <a:cs typeface="Menlo" panose="020B0609030804020204" pitchFamily="49" charset="0"/>
+              </a:rPr>
+              <a:t>---------------  -------------   ---------   -----</a:t>
+            </a:r>
+          </a:p>
+          <a:p>
+            <a:r>
+              <a:rPr lang="en-US" sz="1000" b="1" dirty="0" err="1">
+                <a:solidFill>
+                  <a:srgbClr val="FF0000"/>
+                </a:solidFill>
+                <a:latin typeface="Menlo" panose="020B0609030804020204" pitchFamily="49" charset="0"/>
+                <a:ea typeface="Menlo" panose="020B0609030804020204" pitchFamily="49" charset="0"/>
+                <a:cs typeface="Menlo" panose="020B0609030804020204" pitchFamily="49" charset="0"/>
+              </a:rPr>
+              <a:t>Localca</a:t>
+            </a:r>
+            <a:r>
+              <a:rPr lang="en-US" sz="1000" b="1" dirty="0">
+                <a:solidFill>
+                  <a:srgbClr val="FF0000"/>
+                </a:solidFill>
+                <a:latin typeface="Menlo" panose="020B0609030804020204" pitchFamily="49" charset="0"/>
+                <a:ea typeface="Menlo" panose="020B0609030804020204" pitchFamily="49" charset="0"/>
+                <a:cs typeface="Menlo" panose="020B0609030804020204" pitchFamily="49" charset="0"/>
+              </a:rPr>
+              <a:t>          CERTAUTH        CERTRAUTH   NO</a:t>
+            </a:r>
+          </a:p>
+          <a:p>
+            <a:r>
+              <a:rPr lang="en-US" sz="1000" b="1" dirty="0">
+                <a:solidFill>
+                  <a:srgbClr val="FF0000"/>
+                </a:solidFill>
+                <a:latin typeface="Menlo" panose="020B0609030804020204" pitchFamily="49" charset="0"/>
+                <a:ea typeface="Menlo" panose="020B0609030804020204" pitchFamily="49" charset="0"/>
+                <a:cs typeface="Menlo" panose="020B0609030804020204" pitchFamily="49" charset="0"/>
+              </a:rPr>
+              <a:t>Localhost        ID(ZWESVUSR)    PERSONAL    YES</a:t>
+            </a:r>
+          </a:p>
+          <a:p>
+            <a:r>
+              <a:rPr lang="en-US" sz="1000" b="1" dirty="0" err="1">
+                <a:solidFill>
+                  <a:srgbClr val="FF0000"/>
+                </a:solidFill>
+                <a:latin typeface="Menlo" panose="020B0609030804020204" pitchFamily="49" charset="0"/>
+                <a:ea typeface="Menlo" panose="020B0609030804020204" pitchFamily="49" charset="0"/>
+                <a:cs typeface="Menlo" panose="020B0609030804020204" pitchFamily="49" charset="0"/>
+              </a:rPr>
+              <a:t>Jwtsecret</a:t>
+            </a:r>
+            <a:r>
+              <a:rPr lang="en-US" sz="1000" b="1" dirty="0">
+                <a:solidFill>
+                  <a:srgbClr val="FF0000"/>
+                </a:solidFill>
+                <a:latin typeface="Menlo" panose="020B0609030804020204" pitchFamily="49" charset="0"/>
+                <a:ea typeface="Menlo" panose="020B0609030804020204" pitchFamily="49" charset="0"/>
+                <a:cs typeface="Menlo" panose="020B0609030804020204" pitchFamily="49" charset="0"/>
+              </a:rPr>
+              <a:t>        ID(ZWESVUSR)    PERSONAL    NO</a:t>
+            </a:r>
+          </a:p>
+          <a:p>
+            <a:endParaRPr lang="en-US" sz="1000" b="1" dirty="0">
+              <a:solidFill>
+                <a:srgbClr val="FF0000"/>
+              </a:solidFill>
+              <a:latin typeface="Arial" panose="020B0604020202020204" pitchFamily="34" charset="0"/>
+              <a:ea typeface="Menlo" panose="020B0609030804020204" pitchFamily="49" charset="0"/>
+              <a:cs typeface="Arial" panose="020B0604020202020204" pitchFamily="34" charset="0"/>
+            </a:endParaRPr>
           </a:p>
         </p:txBody>
       </p:sp>
@@ -10320,7 +10296,7 @@
         <p:spPr>
           <a:xfrm>
             <a:off x="240577" y="5277858"/>
-            <a:ext cx="4285577" cy="1479813"/>
+            <a:ext cx="4285577" cy="1489869"/>
           </a:xfrm>
           <a:prstGeom prst="rect">
             <a:avLst/>
@@ -10432,7 +10408,7 @@
                 <a:ea typeface="Menlo" panose="020B0609030804020204" pitchFamily="49" charset="0"/>
                 <a:cs typeface="Menlo" panose="020B0609030804020204" pitchFamily="49" charset="0"/>
               </a:rPr>
-              <a:t>ZoweCert</a:t>
+              <a:t>Localca</a:t>
             </a:r>
             <a:r>
               <a:rPr lang="en-US" sz="1000" b="1" dirty="0">
@@ -10443,12 +10419,12 @@
                 <a:ea typeface="Menlo" panose="020B0609030804020204" pitchFamily="49" charset="0"/>
                 <a:cs typeface="Menlo" panose="020B0609030804020204" pitchFamily="49" charset="0"/>
               </a:rPr>
-              <a:t>	     ID(ZWESVUSR)    PERSONAL    NO</a:t>
-            </a:r>
-          </a:p>
-          <a:p>
-            <a:r>
-              <a:rPr lang="en-US" sz="1000" b="1" dirty="0" err="1">
+              <a:t>          CERTAUTH        CERTRAUTH   NO</a:t>
+            </a:r>
+          </a:p>
+          <a:p>
+            <a:r>
+              <a:rPr lang="en-US" sz="1000" b="1" dirty="0">
                 <a:solidFill>
                   <a:srgbClr val="FF0000"/>
                 </a:solidFill>
@@ -10456,31 +10432,7 @@
                 <a:ea typeface="Menlo" panose="020B0609030804020204" pitchFamily="49" charset="0"/>
                 <a:cs typeface="Menlo" panose="020B0609030804020204" pitchFamily="49" charset="0"/>
               </a:rPr>
-              <a:t>Localca</a:t>
-            </a:r>
-            <a:r>
-              <a:rPr lang="en-US" sz="1000" b="1" dirty="0">
-                <a:solidFill>
-                  <a:srgbClr val="FF0000"/>
-                </a:solidFill>
-                <a:latin typeface="Menlo" panose="020B0609030804020204" pitchFamily="49" charset="0"/>
-                <a:ea typeface="Menlo" panose="020B0609030804020204" pitchFamily="49" charset="0"/>
-                <a:cs typeface="Menlo" panose="020B0609030804020204" pitchFamily="49" charset="0"/>
-              </a:rPr>
-              <a:t>          CERTAUTH        CERTRAUTH   NO</a:t>
-            </a:r>
-          </a:p>
-          <a:p>
-            <a:r>
-              <a:rPr lang="en-US" sz="1000" b="1" dirty="0">
-                <a:solidFill>
-                  <a:srgbClr val="FF0000"/>
-                </a:solidFill>
-                <a:latin typeface="Menlo" panose="020B0609030804020204" pitchFamily="49" charset="0"/>
-                <a:ea typeface="Menlo" panose="020B0609030804020204" pitchFamily="49" charset="0"/>
-                <a:cs typeface="Menlo" panose="020B0609030804020204" pitchFamily="49" charset="0"/>
-              </a:rPr>
-              <a:t>Localhost        ID(ZWESVUSR)    PERSONAL    NO</a:t>
+              <a:t>Localhost        ID(ZWESVUSR)    PERSONAL    YES</a:t>
             </a:r>
           </a:p>
           <a:p>

</xml_diff>